<commit_message>
added template demo webpage
</commit_message>
<xml_diff>
--- a/rconf_powered_by_adobe.pptx
+++ b/rconf_powered_by_adobe.pptx
@@ -110,7 +110,7 @@
   </p:defaultTextStyle>
   <p:extLst>
     <p:ext uri="{EFAFB233-063F-42B5-8137-9DF3F51BA10A}">
-      <p15:sldGuideLst xmlns:p15="http://schemas.microsoft.com/office/powerpoint/2012/main">
+      <p15:sldGuideLst xmlns:p15="http://schemas.microsoft.com/office/powerpoint/2012/main" xmlns="">
         <p15:guide id="1" orient="horz" pos="2880">
           <p15:clr>
             <a:srgbClr val="A4A3A4"/>
@@ -580,7 +580,7 @@
 </file>
 
 <file path=ppt/slideLayouts/slideLayout3.xml><?xml version="1.0" encoding="utf-8"?>
-<p:sldLayout xmlns:a="http://schemas.openxmlformats.org/drawingml/2006/main" xmlns:r="http://schemas.openxmlformats.org/officeDocument/2006/relationships" xmlns:p="http://schemas.openxmlformats.org/presentationml/2006/main" showMasterSp="0" type="obj" preserve="1">
+<p:sldLayout xmlns:a="http://schemas.openxmlformats.org/drawingml/2006/main" xmlns:r="http://schemas.openxmlformats.org/officeDocument/2006/relationships" xmlns:p="http://schemas.openxmlformats.org/presentationml/2006/main" showMasterSp="0" preserve="1" userDrawn="1">
   <p:cSld name="Two Content">
     <p:bg>
       <p:bgPr>
@@ -608,7 +608,7 @@
         <p:nvSpPr>
           <p:cNvPr id="16" name="bk object 16"/>
           <p:cNvSpPr/>
-          <p:nvPr/>
+          <p:nvPr userDrawn="1"/>
         </p:nvSpPr>
         <p:spPr>
           <a:xfrm>
@@ -736,151 +736,6 @@
       </p:sp>
       <p:sp>
         <p:nvSpPr>
-          <p:cNvPr id="19" name="bk object 19"/>
-          <p:cNvSpPr/>
-          <p:nvPr/>
-        </p:nvSpPr>
-        <p:spPr>
-          <a:xfrm>
-            <a:off x="3449160" y="1353491"/>
-            <a:ext cx="514547" cy="185428"/>
-          </a:xfrm>
-          <a:prstGeom prst="rect">
-            <a:avLst/>
-          </a:prstGeom>
-          <a:blipFill>
-            <a:blip r:embed="rId2" cstate="print"/>
-            <a:stretch>
-              <a:fillRect/>
-            </a:stretch>
-          </a:blipFill>
-        </p:spPr>
-        <p:txBody>
-          <a:bodyPr wrap="square" lIns="0" tIns="0" rIns="0" bIns="0" rtlCol="0"/>
-          <a:lstStyle/>
-          <a:p>
-            <a:endParaRPr/>
-          </a:p>
-        </p:txBody>
-      </p:sp>
-      <p:sp>
-        <p:nvSpPr>
-          <p:cNvPr id="20" name="bk object 20"/>
-          <p:cNvSpPr/>
-          <p:nvPr/>
-        </p:nvSpPr>
-        <p:spPr>
-          <a:xfrm>
-            <a:off x="769616" y="1353045"/>
-            <a:ext cx="2748865" cy="437019"/>
-          </a:xfrm>
-          <a:prstGeom prst="rect">
-            <a:avLst/>
-          </a:prstGeom>
-          <a:blipFill>
-            <a:blip r:embed="rId3" cstate="print"/>
-            <a:stretch>
-              <a:fillRect/>
-            </a:stretch>
-          </a:blipFill>
-        </p:spPr>
-        <p:txBody>
-          <a:bodyPr wrap="square" lIns="0" tIns="0" rIns="0" bIns="0" rtlCol="0"/>
-          <a:lstStyle/>
-          <a:p>
-            <a:endParaRPr/>
-          </a:p>
-        </p:txBody>
-      </p:sp>
-      <p:sp>
-        <p:nvSpPr>
-          <p:cNvPr id="21" name="bk object 21"/>
-          <p:cNvSpPr/>
-          <p:nvPr/>
-        </p:nvSpPr>
-        <p:spPr>
-          <a:xfrm>
-            <a:off x="2386421" y="2742520"/>
-            <a:ext cx="132643" cy="144780"/>
-          </a:xfrm>
-          <a:prstGeom prst="rect">
-            <a:avLst/>
-          </a:prstGeom>
-          <a:blipFill>
-            <a:blip r:embed="rId4" cstate="print"/>
-            <a:stretch>
-              <a:fillRect/>
-            </a:stretch>
-          </a:blipFill>
-        </p:spPr>
-        <p:txBody>
-          <a:bodyPr wrap="square" lIns="0" tIns="0" rIns="0" bIns="0" rtlCol="0"/>
-          <a:lstStyle/>
-          <a:p>
-            <a:endParaRPr/>
-          </a:p>
-        </p:txBody>
-      </p:sp>
-      <p:sp>
-        <p:nvSpPr>
-          <p:cNvPr id="22" name="bk object 22"/>
-          <p:cNvSpPr/>
-          <p:nvPr/>
-        </p:nvSpPr>
-        <p:spPr>
-          <a:xfrm>
-            <a:off x="1198401" y="3827229"/>
-            <a:ext cx="594568" cy="186463"/>
-          </a:xfrm>
-          <a:prstGeom prst="rect">
-            <a:avLst/>
-          </a:prstGeom>
-          <a:blipFill>
-            <a:blip r:embed="rId5" cstate="print"/>
-            <a:stretch>
-              <a:fillRect/>
-            </a:stretch>
-          </a:blipFill>
-        </p:spPr>
-        <p:txBody>
-          <a:bodyPr wrap="square" lIns="0" tIns="0" rIns="0" bIns="0" rtlCol="0"/>
-          <a:lstStyle/>
-          <a:p>
-            <a:endParaRPr/>
-          </a:p>
-        </p:txBody>
-      </p:sp>
-      <p:sp>
-        <p:nvSpPr>
-          <p:cNvPr id="23" name="bk object 23"/>
-          <p:cNvSpPr/>
-          <p:nvPr/>
-        </p:nvSpPr>
-        <p:spPr>
-          <a:xfrm>
-            <a:off x="1860676" y="3829991"/>
-            <a:ext cx="1217795" cy="185420"/>
-          </a:xfrm>
-          <a:prstGeom prst="rect">
-            <a:avLst/>
-          </a:prstGeom>
-          <a:blipFill>
-            <a:blip r:embed="rId6" cstate="print"/>
-            <a:stretch>
-              <a:fillRect/>
-            </a:stretch>
-          </a:blipFill>
-        </p:spPr>
-        <p:txBody>
-          <a:bodyPr wrap="square" lIns="0" tIns="0" rIns="0" bIns="0" rtlCol="0"/>
-          <a:lstStyle/>
-          <a:p>
-            <a:endParaRPr/>
-          </a:p>
-        </p:txBody>
-      </p:sp>
-      <p:sp>
-        <p:nvSpPr>
           <p:cNvPr id="2" name="Holder 2"/>
           <p:cNvSpPr>
             <a:spLocks noGrp="1"/>
@@ -901,39 +756,6 @@
                 <a:latin typeface="NanumGothic"/>
                 <a:cs typeface="NanumGothic"/>
               </a:defRPr>
-            </a:lvl1pPr>
-          </a:lstStyle>
-          <a:p>
-            <a:endParaRPr/>
-          </a:p>
-        </p:txBody>
-      </p:sp>
-      <p:sp>
-        <p:nvSpPr>
-          <p:cNvPr id="3" name="Holder 3"/>
-          <p:cNvSpPr>
-            <a:spLocks noGrp="1"/>
-          </p:cNvSpPr>
-          <p:nvPr>
-            <p:ph sz="half" idx="2"/>
-          </p:nvPr>
-        </p:nvSpPr>
-        <p:spPr>
-          <a:xfrm>
-            <a:off x="432752" y="1492631"/>
-            <a:ext cx="3764946" cy="4283202"/>
-          </a:xfrm>
-          <a:prstGeom prst="rect">
-            <a:avLst/>
-          </a:prstGeom>
-        </p:spPr>
-        <p:txBody>
-          <a:bodyPr wrap="square" lIns="0" tIns="0" rIns="0" bIns="0">
-            <a:spAutoFit/>
-          </a:bodyPr>
-          <a:lstStyle>
-            <a:lvl1pPr>
-              <a:defRPr/>
             </a:lvl1pPr>
           </a:lstStyle>
           <a:p>
@@ -970,7 +792,7 @@
             </a:lvl1pPr>
           </a:lstStyle>
           <a:p>
-            <a:endParaRPr/>
+            <a:endParaRPr dirty="0"/>
           </a:p>
         </p:txBody>
       </p:sp>
@@ -2128,7 +1950,7 @@
         </p:nvSpPr>
         <p:spPr>
           <a:xfrm>
-            <a:off x="749299" y="1311275"/>
+            <a:off x="819150" y="1270794"/>
             <a:ext cx="3373754" cy="4787900"/>
           </a:xfrm>
           <a:prstGeom prst="rect">
@@ -2150,85 +1972,94 @@
               </a:spcBef>
             </a:pPr>
             <a:r>
+              <a:rPr sz="1500" b="1" dirty="0">
+                <a:latin typeface="NanumMyeongjo"/>
+                <a:cs typeface="NanumMyeongjo"/>
+              </a:rPr>
+              <a:t>디지털 불평등(Digital </a:t>
+            </a:r>
+            <a:r>
+              <a:rPr sz="1500" b="1" spc="-5" dirty="0">
+                <a:latin typeface="NanumMyeongjo"/>
+                <a:cs typeface="NanumMyeongjo"/>
+              </a:rPr>
+              <a:t>Divide)</a:t>
+            </a:r>
+            <a:r>
+              <a:rPr sz="1500" spc="-5" dirty="0">
+                <a:solidFill>
+                  <a:srgbClr val="FFFFFF"/>
+                </a:solidFill>
+                <a:latin typeface="NanumMyeongjo"/>
+                <a:cs typeface="NanumMyeongjo"/>
+              </a:rPr>
+              <a:t>과 </a:t>
+            </a:r>
+            <a:r>
+              <a:rPr sz="1500" b="1" dirty="0">
+                <a:solidFill>
+                  <a:srgbClr val="FF0000"/>
+                </a:solidFill>
+                <a:latin typeface="NanumMyeongjo"/>
+                <a:cs typeface="NanumMyeongjo"/>
+              </a:rPr>
+              <a:t>디지털  경제전환(Digital </a:t>
+            </a:r>
+            <a:r>
+              <a:rPr sz="1500" b="1" spc="-10" dirty="0">
+                <a:solidFill>
+                  <a:srgbClr val="FF0000"/>
+                </a:solidFill>
+                <a:latin typeface="NanumMyeongjo"/>
+                <a:cs typeface="NanumMyeongjo"/>
+              </a:rPr>
+              <a:t>Transformation)</a:t>
+            </a:r>
+            <a:r>
+              <a:rPr sz="1500" spc="-10" dirty="0">
+                <a:solidFill>
+                  <a:srgbClr val="FFFFFF"/>
+                </a:solidFill>
+                <a:latin typeface="NanumMyeongjo"/>
+                <a:cs typeface="NanumMyeongjo"/>
+              </a:rPr>
+              <a:t>의 </a:t>
+            </a:r>
+            <a:r>
               <a:rPr sz="1500" dirty="0">
-                <a:latin typeface="NanumMyeongjo"/>
-                <a:cs typeface="NanumMyeongjo"/>
-              </a:rPr>
-              <a:t>디지털 불평등(Digital </a:t>
-            </a:r>
-            <a:r>
-              <a:rPr sz="1500" spc="-5" dirty="0">
-                <a:latin typeface="NanumMyeongjo"/>
-                <a:cs typeface="NanumMyeongjo"/>
-              </a:rPr>
-              <a:t>Divide)</a:t>
-            </a:r>
-            <a:r>
-              <a:rPr sz="1500" spc="-5" dirty="0">
                 <a:solidFill>
                   <a:srgbClr val="FFFFFF"/>
                 </a:solidFill>
                 <a:latin typeface="NanumMyeongjo"/>
                 <a:cs typeface="NanumMyeongjo"/>
               </a:rPr>
-              <a:t>과 </a:t>
+              <a:t>가  속화가 코로나19로 보다 명확해진 시대  다. 이러한 변화의 중심에 빅데이터, 기계  학습, 인공지능 등 데이터 기반 기술이 자  리 잡고 있으며 또 집중 관심을 받고</a:t>
+            </a:r>
+            <a:r>
+              <a:rPr sz="1500" spc="-100" dirty="0">
+                <a:solidFill>
+                  <a:srgbClr val="FFFFFF"/>
+                </a:solidFill>
+                <a:latin typeface="NanumMyeongjo"/>
+                <a:cs typeface="NanumMyeongjo"/>
+              </a:rPr>
+              <a:t> </a:t>
             </a:r>
             <a:r>
               <a:rPr sz="1500" dirty="0">
-                <a:latin typeface="NanumMyeongjo"/>
-                <a:cs typeface="NanumMyeongjo"/>
-              </a:rPr>
-              <a:t>디지털  경제전환(Digital </a:t>
-            </a:r>
-            <a:r>
-              <a:rPr sz="1500" spc="-10" dirty="0">
-                <a:latin typeface="NanumMyeongjo"/>
-                <a:cs typeface="NanumMyeongjo"/>
-              </a:rPr>
-              <a:t>Transformation)</a:t>
-            </a:r>
-            <a:r>
-              <a:rPr sz="1500" spc="-10" dirty="0">
                 <a:solidFill>
                   <a:srgbClr val="FFFFFF"/>
                 </a:solidFill>
                 <a:latin typeface="NanumMyeongjo"/>
                 <a:cs typeface="NanumMyeongjo"/>
               </a:rPr>
-              <a:t>의 </a:t>
-            </a:r>
-            <a:r>
-              <a:rPr sz="1500" dirty="0">
-                <a:solidFill>
-                  <a:srgbClr val="FFFFFF"/>
-                </a:solidFill>
-                <a:latin typeface="NanumMyeongjo"/>
-                <a:cs typeface="NanumMyeongjo"/>
-              </a:rPr>
-              <a:t>가  속화가 코로나19로 보다 명확해진 시대  다. 이러한 변화의 중심에 빅데이터, 기계  학습, 인공지능 등 데이터 기반 기술이 자  리 잡고 있으며 또 집중 관심을 받고</a:t>
-            </a:r>
-            <a:r>
-              <a:rPr sz="1500" spc="-100" dirty="0">
-                <a:solidFill>
-                  <a:srgbClr val="FFFFFF"/>
-                </a:solidFill>
-                <a:latin typeface="NanumMyeongjo"/>
-                <a:cs typeface="NanumMyeongjo"/>
-              </a:rPr>
-              <a:t> </a:t>
-            </a:r>
-            <a:r>
-              <a:rPr sz="1500" dirty="0">
-                <a:solidFill>
-                  <a:srgbClr val="FFFFFF"/>
-                </a:solidFill>
-                <a:latin typeface="NanumMyeongjo"/>
-                <a:cs typeface="NanumMyeongjo"/>
-              </a:rPr>
               <a:t>있다.  데이터 시대를 맞아 </a:t>
             </a:r>
             <a:r>
-              <a:rPr sz="1500" spc="-5" dirty="0">
+              <a:rPr sz="1500" b="1" spc="-5" dirty="0">
+                <a:solidFill>
+                  <a:schemeClr val="bg1"/>
+                </a:solidFill>
                 <a:latin typeface="NanumMyeongjo"/>
                 <a:cs typeface="NanumMyeongjo"/>
               </a:rPr>
@@ -2299,7 +2130,10 @@
               <a:t>금번 </a:t>
             </a:r>
             <a:r>
-              <a:rPr sz="1500" dirty="0">
+              <a:rPr sz="1500" b="1" dirty="0">
+                <a:solidFill>
+                  <a:srgbClr val="00B050"/>
+                </a:solidFill>
                 <a:latin typeface="NanumMyeongjo"/>
                 <a:cs typeface="NanumMyeongjo"/>
               </a:rPr>
@@ -2359,35 +2193,6 @@
               <a:latin typeface="NanumMyeongjo"/>
               <a:cs typeface="NanumMyeongjo"/>
             </a:endParaRPr>
-          </a:p>
-        </p:txBody>
-      </p:sp>
-      <p:sp>
-        <p:nvSpPr>
-          <p:cNvPr id="3" name="object 3"/>
-          <p:cNvSpPr/>
-          <p:nvPr/>
-        </p:nvSpPr>
-        <p:spPr>
-          <a:xfrm>
-            <a:off x="4752975" y="1382066"/>
-            <a:ext cx="1142999" cy="227658"/>
-          </a:xfrm>
-          <a:prstGeom prst="rect">
-            <a:avLst/>
-          </a:prstGeom>
-          <a:blipFill>
-            <a:blip r:embed="rId2" cstate="print"/>
-            <a:stretch>
-              <a:fillRect/>
-            </a:stretch>
-          </a:blipFill>
-        </p:spPr>
-        <p:txBody>
-          <a:bodyPr wrap="square" lIns="0" tIns="0" rIns="0" bIns="0" rtlCol="0"/>
-          <a:lstStyle/>
-          <a:p>
-            <a:endParaRPr/>
           </a:p>
         </p:txBody>
       </p:sp>
@@ -2431,35 +2236,6 @@
       </p:sp>
       <p:sp>
         <p:nvSpPr>
-          <p:cNvPr id="5" name="object 5"/>
-          <p:cNvSpPr/>
-          <p:nvPr/>
-        </p:nvSpPr>
-        <p:spPr>
-          <a:xfrm>
-            <a:off x="4752975" y="1858273"/>
-            <a:ext cx="1325012" cy="227701"/>
-          </a:xfrm>
-          <a:prstGeom prst="rect">
-            <a:avLst/>
-          </a:prstGeom>
-          <a:blipFill>
-            <a:blip r:embed="rId3" cstate="print"/>
-            <a:stretch>
-              <a:fillRect/>
-            </a:stretch>
-          </a:blipFill>
-        </p:spPr>
-        <p:txBody>
-          <a:bodyPr wrap="square" lIns="0" tIns="0" rIns="0" bIns="0" rtlCol="0"/>
-          <a:lstStyle/>
-          <a:p>
-            <a:endParaRPr/>
-          </a:p>
-        </p:txBody>
-      </p:sp>
-      <p:sp>
-        <p:nvSpPr>
           <p:cNvPr id="6" name="object 6"/>
           <p:cNvSpPr/>
           <p:nvPr/>
@@ -2498,43 +2274,14 @@
       </p:sp>
       <p:sp>
         <p:nvSpPr>
-          <p:cNvPr id="7" name="object 7"/>
-          <p:cNvSpPr/>
-          <p:nvPr/>
-        </p:nvSpPr>
-        <p:spPr>
-          <a:xfrm>
-            <a:off x="4751289" y="2334566"/>
-            <a:ext cx="1801910" cy="227658"/>
-          </a:xfrm>
-          <a:prstGeom prst="rect">
-            <a:avLst/>
-          </a:prstGeom>
-          <a:blipFill>
-            <a:blip r:embed="rId4" cstate="print"/>
-            <a:stretch>
-              <a:fillRect/>
-            </a:stretch>
-          </a:blipFill>
-        </p:spPr>
-        <p:txBody>
-          <a:bodyPr wrap="square" lIns="0" tIns="0" rIns="0" bIns="0" rtlCol="0"/>
-          <a:lstStyle/>
-          <a:p>
-            <a:endParaRPr/>
-          </a:p>
-        </p:txBody>
-      </p:sp>
-      <p:sp>
-        <p:nvSpPr>
           <p:cNvPr id="8" name="object 8"/>
           <p:cNvSpPr txBox="1"/>
           <p:nvPr/>
         </p:nvSpPr>
         <p:spPr>
           <a:xfrm>
-            <a:off x="4525516" y="1339850"/>
-            <a:ext cx="2042795" cy="1206500"/>
+            <a:off x="5010150" y="1416050"/>
+            <a:ext cx="2743200" cy="2875146"/>
           </a:xfrm>
           <a:prstGeom prst="rect">
             <a:avLst/>
@@ -2548,7 +2295,7 @@
           <a:p>
             <a:pPr marL="224154" indent="-212090">
               <a:lnSpc>
-                <a:spcPct val="100000"/>
+                <a:spcPct val="150000"/>
               </a:lnSpc>
               <a:spcBef>
                 <a:spcPts val="100"/>
@@ -2562,22 +2309,25 @@
               </a:tabLst>
             </a:pPr>
             <a:r>
-              <a:rPr sz="1500" dirty="0">
-                <a:latin typeface="NanumMyeongjo"/>
+              <a:rPr sz="1600" b="1" dirty="0">
+                <a:latin typeface="나눔명조" pitchFamily="18" charset="-127"/>
+                <a:ea typeface="나눔명조" pitchFamily="18" charset="-127"/>
                 <a:cs typeface="NanumMyeongjo"/>
               </a:rPr>
               <a:t>디지털</a:t>
             </a:r>
             <a:r>
-              <a:rPr sz="1500" spc="-10" dirty="0">
-                <a:latin typeface="NanumMyeongjo"/>
+              <a:rPr sz="1600" b="1" spc="-10" dirty="0">
+                <a:latin typeface="나눔명조" pitchFamily="18" charset="-127"/>
+                <a:ea typeface="나눔명조" pitchFamily="18" charset="-127"/>
                 <a:cs typeface="NanumMyeongjo"/>
               </a:rPr>
               <a:t> </a:t>
             </a:r>
             <a:r>
-              <a:rPr sz="1500" dirty="0">
-                <a:latin typeface="NanumMyeongjo"/>
+              <a:rPr sz="1600" b="1" dirty="0">
+                <a:latin typeface="나눔명조" pitchFamily="18" charset="-127"/>
+                <a:ea typeface="나눔명조" pitchFamily="18" charset="-127"/>
                 <a:cs typeface="NanumMyeongjo"/>
               </a:rPr>
               <a:t>불평등</a:t>
@@ -2586,7 +2336,7 @@
           <a:p>
             <a:pPr>
               <a:lnSpc>
-                <a:spcPct val="100000"/>
+                <a:spcPct val="150000"/>
               </a:lnSpc>
               <a:spcBef>
                 <a:spcPts val="15"/>
@@ -2597,15 +2347,16 @@
               <a:buFont typeface="NanumMyeongjo"/>
               <a:buAutoNum type="arabicPeriod"/>
             </a:pPr>
-            <a:endParaRPr sz="1200" dirty="0">
-              <a:latin typeface="NanumMyeongjo"/>
+            <a:endParaRPr sz="1400" b="1" dirty="0">
+              <a:latin typeface="나눔명조" pitchFamily="18" charset="-127"/>
+              <a:ea typeface="나눔명조" pitchFamily="18" charset="-127"/>
               <a:cs typeface="NanumMyeongjo"/>
             </a:endParaRPr>
           </a:p>
           <a:p>
             <a:pPr marL="224154" indent="-212090">
               <a:lnSpc>
-                <a:spcPct val="100000"/>
+                <a:spcPct val="150000"/>
               </a:lnSpc>
               <a:buClr>
                 <a:srgbClr val="FFFFFF"/>
@@ -2616,22 +2367,34 @@
               </a:tabLst>
             </a:pPr>
             <a:r>
-              <a:rPr sz="1500" dirty="0">
-                <a:latin typeface="NanumMyeongjo"/>
+              <a:rPr sz="1600" b="1" dirty="0">
+                <a:solidFill>
+                  <a:srgbClr val="FF0000"/>
+                </a:solidFill>
+                <a:latin typeface="나눔명조" pitchFamily="18" charset="-127"/>
+                <a:ea typeface="나눔명조" pitchFamily="18" charset="-127"/>
                 <a:cs typeface="NanumMyeongjo"/>
               </a:rPr>
               <a:t>디지털</a:t>
             </a:r>
             <a:r>
-              <a:rPr sz="1500" spc="-15" dirty="0">
-                <a:latin typeface="NanumMyeongjo"/>
+              <a:rPr sz="1600" b="1" spc="-15" dirty="0">
+                <a:solidFill>
+                  <a:srgbClr val="FF0000"/>
+                </a:solidFill>
+                <a:latin typeface="나눔명조" pitchFamily="18" charset="-127"/>
+                <a:ea typeface="나눔명조" pitchFamily="18" charset="-127"/>
                 <a:cs typeface="NanumMyeongjo"/>
               </a:rPr>
               <a:t> </a:t>
             </a:r>
             <a:r>
-              <a:rPr sz="1500" dirty="0">
-                <a:latin typeface="NanumMyeongjo"/>
+              <a:rPr sz="1600" b="1" dirty="0">
+                <a:solidFill>
+                  <a:srgbClr val="FF0000"/>
+                </a:solidFill>
+                <a:latin typeface="나눔명조" pitchFamily="18" charset="-127"/>
+                <a:ea typeface="나눔명조" pitchFamily="18" charset="-127"/>
                 <a:cs typeface="NanumMyeongjo"/>
               </a:rPr>
               <a:t>경제전환</a:t>
@@ -2640,7 +2403,7 @@
           <a:p>
             <a:pPr>
               <a:lnSpc>
-                <a:spcPct val="100000"/>
+                <a:spcPct val="150000"/>
               </a:lnSpc>
               <a:spcBef>
                 <a:spcPts val="15"/>
@@ -2651,15 +2414,16 @@
               <a:buFont typeface="NanumMyeongjo"/>
               <a:buAutoNum type="arabicPeriod"/>
             </a:pPr>
-            <a:endParaRPr sz="1200" dirty="0">
-              <a:latin typeface="NanumMyeongjo"/>
+            <a:endParaRPr sz="1400" b="1" dirty="0">
+              <a:latin typeface="나눔명조" pitchFamily="18" charset="-127"/>
+              <a:ea typeface="나눔명조" pitchFamily="18" charset="-127"/>
               <a:cs typeface="NanumMyeongjo"/>
             </a:endParaRPr>
           </a:p>
           <a:p>
             <a:pPr marL="224154" indent="-212090">
               <a:lnSpc>
-                <a:spcPct val="100000"/>
+                <a:spcPct val="150000"/>
               </a:lnSpc>
               <a:buClr>
                 <a:srgbClr val="FFFFFF"/>
@@ -2670,26 +2434,134 @@
               </a:tabLst>
             </a:pPr>
             <a:r>
-              <a:rPr sz="1500" dirty="0">
-                <a:latin typeface="NanumMyeongjo"/>
-                <a:cs typeface="NanumMyeongjo"/>
-              </a:rPr>
-              <a:t>한국 R 컨퍼런스</a:t>
-            </a:r>
-            <a:r>
-              <a:rPr sz="1500" spc="-95" dirty="0">
-                <a:latin typeface="NanumMyeongjo"/>
+              <a:rPr sz="1600" b="1" dirty="0">
+                <a:solidFill>
+                  <a:srgbClr val="00B050"/>
+                </a:solidFill>
+                <a:latin typeface="나눔명조" pitchFamily="18" charset="-127"/>
+                <a:ea typeface="나눔명조" pitchFamily="18" charset="-127"/>
+                <a:cs typeface="NanumMyeongjo"/>
+              </a:rPr>
+              <a:t>한국 R </a:t>
+            </a:r>
+            <a:r>
+              <a:rPr sz="1600" b="1" dirty="0" err="1">
+                <a:solidFill>
+                  <a:srgbClr val="00B050"/>
+                </a:solidFill>
+                <a:latin typeface="나눔명조" pitchFamily="18" charset="-127"/>
+                <a:ea typeface="나눔명조" pitchFamily="18" charset="-127"/>
+                <a:cs typeface="NanumMyeongjo"/>
+              </a:rPr>
+              <a:t>컨퍼런스</a:t>
+            </a:r>
+            <a:r>
+              <a:rPr sz="1600" b="1" spc="-95" dirty="0">
+                <a:solidFill>
+                  <a:srgbClr val="00B050"/>
+                </a:solidFill>
+                <a:latin typeface="나눔명조" pitchFamily="18" charset="-127"/>
+                <a:ea typeface="나눔명조" pitchFamily="18" charset="-127"/>
                 <a:cs typeface="NanumMyeongjo"/>
               </a:rPr>
               <a:t> </a:t>
             </a:r>
             <a:r>
-              <a:rPr sz="1500" dirty="0">
-                <a:latin typeface="NanumMyeongjo"/>
+              <a:rPr sz="1600" b="1" dirty="0" smtClean="0">
+                <a:solidFill>
+                  <a:srgbClr val="00B050"/>
+                </a:solidFill>
+                <a:latin typeface="나눔명조" pitchFamily="18" charset="-127"/>
+                <a:ea typeface="나눔명조" pitchFamily="18" charset="-127"/>
                 <a:cs typeface="NanumMyeongjo"/>
               </a:rPr>
               <a:t>2021</a:t>
             </a:r>
+            <a:endParaRPr lang="en-US" sz="1600" b="1" dirty="0" smtClean="0">
+              <a:solidFill>
+                <a:srgbClr val="00B050"/>
+              </a:solidFill>
+              <a:latin typeface="나눔명조" pitchFamily="18" charset="-127"/>
+              <a:ea typeface="나눔명조" pitchFamily="18" charset="-127"/>
+              <a:cs typeface="NanumMyeongjo"/>
+            </a:endParaRPr>
+          </a:p>
+          <a:p>
+            <a:pPr marL="12064">
+              <a:lnSpc>
+                <a:spcPct val="150000"/>
+              </a:lnSpc>
+              <a:buClr>
+                <a:srgbClr val="FFFFFF"/>
+              </a:buClr>
+              <a:tabLst>
+                <a:tab pos="224790" algn="l"/>
+              </a:tabLst>
+            </a:pPr>
+            <a:endParaRPr lang="en-US" sz="1600" b="1" dirty="0" smtClean="0">
+              <a:solidFill>
+                <a:srgbClr val="00B050"/>
+              </a:solidFill>
+              <a:latin typeface="나눔명조" pitchFamily="18" charset="-127"/>
+              <a:ea typeface="나눔명조" pitchFamily="18" charset="-127"/>
+              <a:cs typeface="NanumMyeongjo"/>
+            </a:endParaRPr>
+          </a:p>
+          <a:p>
+            <a:pPr marL="266700" indent="-255588">
+              <a:lnSpc>
+                <a:spcPct val="150000"/>
+              </a:lnSpc>
+              <a:buClr>
+                <a:srgbClr val="FFFFFF"/>
+              </a:buClr>
+              <a:buFont typeface="+mj-lt"/>
+              <a:buAutoNum type="arabicPeriod" startAt="4"/>
+              <a:tabLst>
+                <a:tab pos="224790" algn="l"/>
+              </a:tabLst>
+            </a:pPr>
+            <a:r>
+              <a:rPr lang="ko-KR" altLang="en-US" sz="1600" b="1" dirty="0">
+                <a:solidFill>
+                  <a:schemeClr val="bg1"/>
+                </a:solidFill>
+                <a:latin typeface="나눔명조" pitchFamily="18" charset="-127"/>
+                <a:ea typeface="나눔명조" pitchFamily="18" charset="-127"/>
+                <a:cs typeface="NanumMyeongjo"/>
+              </a:rPr>
+              <a:t>마무리</a:t>
+            </a:r>
+            <a:endParaRPr lang="ko-KR" altLang="en-US" sz="1600" b="1" dirty="0">
+              <a:solidFill>
+                <a:schemeClr val="bg1"/>
+              </a:solidFill>
+              <a:latin typeface="나눔명조" pitchFamily="18" charset="-127"/>
+              <a:ea typeface="나눔명조" pitchFamily="18" charset="-127"/>
+              <a:cs typeface="NanumMyeongjo"/>
+            </a:endParaRPr>
+          </a:p>
+          <a:p>
+            <a:pPr marL="224154" indent="-212090">
+              <a:lnSpc>
+                <a:spcPct val="150000"/>
+              </a:lnSpc>
+              <a:buClr>
+                <a:srgbClr val="FFFFFF"/>
+              </a:buClr>
+              <a:buAutoNum type="arabicPeriod" startAt="4"/>
+              <a:tabLst>
+                <a:tab pos="224790" algn="l"/>
+              </a:tabLst>
+            </a:pPr>
+            <a:endParaRPr sz="1600" b="1" dirty="0">
+              <a:solidFill>
+                <a:srgbClr val="00B050"/>
+              </a:solidFill>
+              <a:latin typeface="나눔명조" pitchFamily="18" charset="-127"/>
+              <a:ea typeface="나눔명조" pitchFamily="18" charset="-127"/>
+              <a:cs typeface="NanumMyeongjo"/>
+            </a:endParaRPr>
           </a:p>
         </p:txBody>
       </p:sp>
@@ -2735,77 +2607,6 @@
               <a:rPr dirty="0"/>
               <a:t>5</a:t>
             </a:r>
-          </a:p>
-        </p:txBody>
-      </p:sp>
-      <p:sp>
-        <p:nvSpPr>
-          <p:cNvPr id="9" name="object 9"/>
-          <p:cNvSpPr txBox="1"/>
-          <p:nvPr/>
-        </p:nvSpPr>
-        <p:spPr>
-          <a:xfrm>
-            <a:off x="4525516" y="2768600"/>
-            <a:ext cx="783590" cy="254000"/>
-          </a:xfrm>
-          <a:prstGeom prst="rect">
-            <a:avLst/>
-          </a:prstGeom>
-        </p:spPr>
-        <p:txBody>
-          <a:bodyPr vert="horz" wrap="square" lIns="0" tIns="12700" rIns="0" bIns="0" rtlCol="0">
-            <a:spAutoFit/>
-          </a:bodyPr>
-          <a:lstStyle/>
-          <a:p>
-            <a:pPr marL="12700">
-              <a:lnSpc>
-                <a:spcPct val="100000"/>
-              </a:lnSpc>
-              <a:spcBef>
-                <a:spcPts val="100"/>
-              </a:spcBef>
-            </a:pPr>
-            <a:r>
-              <a:rPr sz="1500" dirty="0">
-                <a:solidFill>
-                  <a:srgbClr val="FFFFFF"/>
-                </a:solidFill>
-                <a:latin typeface="NanumMyeongjo"/>
-                <a:cs typeface="NanumMyeongjo"/>
-              </a:rPr>
-              <a:t>4.</a:t>
-            </a:r>
-            <a:r>
-              <a:rPr sz="1500" spc="-85" dirty="0">
-                <a:solidFill>
-                  <a:srgbClr val="FFFFFF"/>
-                </a:solidFill>
-                <a:latin typeface="NanumMyeongjo"/>
-                <a:cs typeface="NanumMyeongjo"/>
-              </a:rPr>
-              <a:t> </a:t>
-            </a:r>
-            <a:r>
-              <a:rPr sz="1500" u="heavy" spc="5" dirty="0">
-                <a:solidFill>
-                  <a:srgbClr val="FFFFFF"/>
-                </a:solidFill>
-                <a:uFill>
-                  <a:solidFill>
-                    <a:srgbClr val="FFFFFF"/>
-                  </a:solidFill>
-                </a:uFill>
-                <a:latin typeface="NanumMyeongjo"/>
-                <a:cs typeface="NanumMyeongjo"/>
-              </a:rPr>
-              <a:t>마무리</a:t>
-            </a:r>
-            <a:endParaRPr sz="1500">
-              <a:latin typeface="NanumMyeongjo"/>
-              <a:cs typeface="NanumMyeongjo"/>
-            </a:endParaRPr>
           </a:p>
         </p:txBody>
       </p:sp>

</xml_diff>